<commit_message>
finishing up last figures
</commit_message>
<xml_diff>
--- a/mapper_arm_data_2-25.pptx
+++ b/mapper_arm_data_2-25.pptx
@@ -6,7 +6,9 @@
   </p:sldMasterIdLst>
   <p:sldIdLst>
     <p:sldId id="256" r:id="rId2"/>
-    <p:sldId id="257" r:id="rId3"/>
+    <p:sldId id="258" r:id="rId3"/>
+    <p:sldId id="257" r:id="rId4"/>
+    <p:sldId id="259" r:id="rId5"/>
   </p:sldIdLst>
   <p:sldSz cx="12192000" cy="6858000"/>
   <p:notesSz cx="6858000" cy="9144000"/>
@@ -105,6 +107,11 @@
       </a:defRPr>
     </a:lvl9pPr>
   </p:defaultTextStyle>
+  <p:extLst>
+    <p:ext uri="{EFAFB233-063F-42B5-8137-9DF3F51BA10A}">
+      <p15:sldGuideLst xmlns:p15="http://schemas.microsoft.com/office/powerpoint/2012/main"/>
+    </p:ext>
+  </p:extLst>
 </p:presentation>
 </file>
 
@@ -255,7 +262,7 @@
           <a:p>
             <a:fld id="{17A6B762-B983-6C48-920A-FB1B1550B370}" type="datetimeFigureOut">
               <a:rPr lang="en-US" smtClean="0"/>
-              <a:t>3/7/22</a:t>
+              <a:t>5/25/22</a:t>
             </a:fld>
             <a:endParaRPr lang="en-US"/>
           </a:p>
@@ -453,7 +460,7 @@
           <a:p>
             <a:fld id="{17A6B762-B983-6C48-920A-FB1B1550B370}" type="datetimeFigureOut">
               <a:rPr lang="en-US" smtClean="0"/>
-              <a:t>3/7/22</a:t>
+              <a:t>5/25/22</a:t>
             </a:fld>
             <a:endParaRPr lang="en-US"/>
           </a:p>
@@ -661,7 +668,7 @@
           <a:p>
             <a:fld id="{17A6B762-B983-6C48-920A-FB1B1550B370}" type="datetimeFigureOut">
               <a:rPr lang="en-US" smtClean="0"/>
-              <a:t>3/7/22</a:t>
+              <a:t>5/25/22</a:t>
             </a:fld>
             <a:endParaRPr lang="en-US"/>
           </a:p>
@@ -859,7 +866,7 @@
           <a:p>
             <a:fld id="{17A6B762-B983-6C48-920A-FB1B1550B370}" type="datetimeFigureOut">
               <a:rPr lang="en-US" smtClean="0"/>
-              <a:t>3/7/22</a:t>
+              <a:t>5/25/22</a:t>
             </a:fld>
             <a:endParaRPr lang="en-US"/>
           </a:p>
@@ -1134,7 +1141,7 @@
           <a:p>
             <a:fld id="{17A6B762-B983-6C48-920A-FB1B1550B370}" type="datetimeFigureOut">
               <a:rPr lang="en-US" smtClean="0"/>
-              <a:t>3/7/22</a:t>
+              <a:t>5/25/22</a:t>
             </a:fld>
             <a:endParaRPr lang="en-US"/>
           </a:p>
@@ -1399,7 +1406,7 @@
           <a:p>
             <a:fld id="{17A6B762-B983-6C48-920A-FB1B1550B370}" type="datetimeFigureOut">
               <a:rPr lang="en-US" smtClean="0"/>
-              <a:t>3/7/22</a:t>
+              <a:t>5/25/22</a:t>
             </a:fld>
             <a:endParaRPr lang="en-US"/>
           </a:p>
@@ -1811,7 +1818,7 @@
           <a:p>
             <a:fld id="{17A6B762-B983-6C48-920A-FB1B1550B370}" type="datetimeFigureOut">
               <a:rPr lang="en-US" smtClean="0"/>
-              <a:t>3/7/22</a:t>
+              <a:t>5/25/22</a:t>
             </a:fld>
             <a:endParaRPr lang="en-US"/>
           </a:p>
@@ -1952,7 +1959,7 @@
           <a:p>
             <a:fld id="{17A6B762-B983-6C48-920A-FB1B1550B370}" type="datetimeFigureOut">
               <a:rPr lang="en-US" smtClean="0"/>
-              <a:t>3/7/22</a:t>
+              <a:t>5/25/22</a:t>
             </a:fld>
             <a:endParaRPr lang="en-US"/>
           </a:p>
@@ -2065,7 +2072,7 @@
           <a:p>
             <a:fld id="{17A6B762-B983-6C48-920A-FB1B1550B370}" type="datetimeFigureOut">
               <a:rPr lang="en-US" smtClean="0"/>
-              <a:t>3/7/22</a:t>
+              <a:t>5/25/22</a:t>
             </a:fld>
             <a:endParaRPr lang="en-US"/>
           </a:p>
@@ -2376,7 +2383,7 @@
           <a:p>
             <a:fld id="{17A6B762-B983-6C48-920A-FB1B1550B370}" type="datetimeFigureOut">
               <a:rPr lang="en-US" smtClean="0"/>
-              <a:t>3/7/22</a:t>
+              <a:t>5/25/22</a:t>
             </a:fld>
             <a:endParaRPr lang="en-US"/>
           </a:p>
@@ -2664,7 +2671,7 @@
           <a:p>
             <a:fld id="{17A6B762-B983-6C48-920A-FB1B1550B370}" type="datetimeFigureOut">
               <a:rPr lang="en-US" smtClean="0"/>
-              <a:t>3/7/22</a:t>
+              <a:t>5/25/22</a:t>
             </a:fld>
             <a:endParaRPr lang="en-US"/>
           </a:p>
@@ -2905,7 +2912,7 @@
           <a:p>
             <a:fld id="{17A6B762-B983-6C48-920A-FB1B1550B370}" type="datetimeFigureOut">
               <a:rPr lang="en-US" smtClean="0"/>
-              <a:t>3/7/22</a:t>
+              <a:t>5/25/22</a:t>
             </a:fld>
             <a:endParaRPr lang="en-US"/>
           </a:p>
@@ -3532,15 +3539,7 @@
           <a:p>
             <a:r>
               <a:rPr lang="en-US" dirty="0"/>
-              <a:t>Plotting Bx, By, </a:t>
-            </a:r>
-            <a:r>
-              <a:rPr lang="en-US" dirty="0" err="1"/>
-              <a:t>Bz</a:t>
-            </a:r>
-            <a:r>
-              <a:rPr lang="en-US" dirty="0"/>
-              <a:t> vs. x </a:t>
+              <a:t>Plotting Bx, By, Bz vs. x </a:t>
             </a:r>
           </a:p>
         </p:txBody>
@@ -3575,15 +3574,7 @@
           <a:p>
             <a:r>
               <a:rPr lang="en-US" dirty="0"/>
-              <a:t>Plotting Bx, By, </a:t>
-            </a:r>
-            <a:r>
-              <a:rPr lang="en-US" dirty="0" err="1"/>
-              <a:t>Bz</a:t>
-            </a:r>
-            <a:r>
-              <a:rPr lang="en-US" dirty="0"/>
-              <a:t> vs. y </a:t>
+              <a:t>Plotting Bx, By, Bz vs. y </a:t>
             </a:r>
           </a:p>
         </p:txBody>
@@ -3655,10 +3646,10 @@
       </p:grpSpPr>
       <p:pic>
         <p:nvPicPr>
-          <p:cNvPr id="7" name="Picture 6" descr="Chart, scatter chart&#10;&#10;Description automatically generated">
-            <a:extLst>
-              <a:ext uri="{FF2B5EF4-FFF2-40B4-BE49-F238E27FC236}">
-                <a16:creationId xmlns:a16="http://schemas.microsoft.com/office/drawing/2014/main" id="{67E39C00-F53F-B54D-B1A7-7BC2678B21E1}"/>
+          <p:cNvPr id="5" name="Picture 4" descr="Chart, scatter chart&#10;&#10;Description automatically generated">
+            <a:extLst>
+              <a:ext uri="{FF2B5EF4-FFF2-40B4-BE49-F238E27FC236}">
+                <a16:creationId xmlns:a16="http://schemas.microsoft.com/office/drawing/2014/main" id="{6B2DFCCD-70E4-C440-9D50-63A4D2066721}"/>
               </a:ext>
             </a:extLst>
           </p:cNvPr>
@@ -3675,8 +3666,8 @@
         </p:blipFill>
         <p:spPr>
           <a:xfrm>
-            <a:off x="0" y="1065875"/>
-            <a:ext cx="8164443" cy="4283412"/>
+            <a:off x="89457" y="117391"/>
+            <a:ext cx="5486400" cy="3103466"/>
           </a:xfrm>
           <a:prstGeom prst="rect">
             <a:avLst/>
@@ -3685,10 +3676,10 @@
       </p:pic>
       <p:pic>
         <p:nvPicPr>
-          <p:cNvPr id="9" name="Picture 8" descr="Chart, scatter chart&#10;&#10;Description automatically generated">
-            <a:extLst>
-              <a:ext uri="{FF2B5EF4-FFF2-40B4-BE49-F238E27FC236}">
-                <a16:creationId xmlns:a16="http://schemas.microsoft.com/office/drawing/2014/main" id="{611074B3-8E86-7F49-B8DB-34F85BAB3C33}"/>
+          <p:cNvPr id="7" name="Picture 6" descr="Chart, scatter chart&#10;&#10;Description automatically generated">
+            <a:extLst>
+              <a:ext uri="{FF2B5EF4-FFF2-40B4-BE49-F238E27FC236}">
+                <a16:creationId xmlns:a16="http://schemas.microsoft.com/office/drawing/2014/main" id="{68ADB48A-1E2D-1A42-939B-BF64A06A23C4}"/>
               </a:ext>
             </a:extLst>
           </p:cNvPr>
@@ -3705,6 +3696,724 @@
         </p:blipFill>
         <p:spPr>
           <a:xfrm>
+            <a:off x="3359664" y="117391"/>
+            <a:ext cx="6119499" cy="3166697"/>
+          </a:xfrm>
+          <a:prstGeom prst="rect">
+            <a:avLst/>
+          </a:prstGeom>
+        </p:spPr>
+      </p:pic>
+      <p:pic>
+        <p:nvPicPr>
+          <p:cNvPr id="9" name="Picture 8" descr="Chart, scatter chart&#10;&#10;Description automatically generated">
+            <a:extLst>
+              <a:ext uri="{FF2B5EF4-FFF2-40B4-BE49-F238E27FC236}">
+                <a16:creationId xmlns:a16="http://schemas.microsoft.com/office/drawing/2014/main" id="{856F8B54-81B4-D541-9A27-1D252796CFAC}"/>
+              </a:ext>
+            </a:extLst>
+          </p:cNvPr>
+          <p:cNvPicPr>
+            <a:picLocks noChangeAspect="1"/>
+          </p:cNvPicPr>
+          <p:nvPr/>
+        </p:nvPicPr>
+        <p:blipFill>
+          <a:blip r:embed="rId4"/>
+          <a:stretch>
+            <a:fillRect/>
+          </a:stretch>
+        </p:blipFill>
+        <p:spPr>
+          <a:xfrm>
+            <a:off x="7000468" y="117391"/>
+            <a:ext cx="4957389" cy="3166697"/>
+          </a:xfrm>
+          <a:prstGeom prst="rect">
+            <a:avLst/>
+          </a:prstGeom>
+        </p:spPr>
+      </p:pic>
+      <p:pic>
+        <p:nvPicPr>
+          <p:cNvPr id="11" name="Picture 10" descr="Chart, scatter chart&#10;&#10;Description automatically generated">
+            <a:extLst>
+              <a:ext uri="{FF2B5EF4-FFF2-40B4-BE49-F238E27FC236}">
+                <a16:creationId xmlns:a16="http://schemas.microsoft.com/office/drawing/2014/main" id="{3DA28BC8-3F1E-2C46-BFC1-71A3BC526BC2}"/>
+              </a:ext>
+            </a:extLst>
+          </p:cNvPr>
+          <p:cNvPicPr>
+            <a:picLocks noChangeAspect="1"/>
+          </p:cNvPicPr>
+          <p:nvPr/>
+        </p:nvPicPr>
+        <p:blipFill>
+          <a:blip r:embed="rId5"/>
+          <a:stretch>
+            <a:fillRect/>
+          </a:stretch>
+        </p:blipFill>
+        <p:spPr>
+          <a:xfrm>
+            <a:off x="0" y="3429000"/>
+            <a:ext cx="5721212" cy="3076020"/>
+          </a:xfrm>
+          <a:prstGeom prst="rect">
+            <a:avLst/>
+          </a:prstGeom>
+        </p:spPr>
+      </p:pic>
+      <p:pic>
+        <p:nvPicPr>
+          <p:cNvPr id="13" name="Picture 12" descr="Chart, scatter chart&#10;&#10;Description automatically generated">
+            <a:extLst>
+              <a:ext uri="{FF2B5EF4-FFF2-40B4-BE49-F238E27FC236}">
+                <a16:creationId xmlns:a16="http://schemas.microsoft.com/office/drawing/2014/main" id="{041E5DD9-4C22-9F49-AD10-BE030375C18A}"/>
+              </a:ext>
+            </a:extLst>
+          </p:cNvPr>
+          <p:cNvPicPr>
+            <a:picLocks noChangeAspect="1"/>
+          </p:cNvPicPr>
+          <p:nvPr/>
+        </p:nvPicPr>
+        <p:blipFill>
+          <a:blip r:embed="rId6"/>
+          <a:stretch>
+            <a:fillRect/>
+          </a:stretch>
+        </p:blipFill>
+        <p:spPr>
+          <a:xfrm>
+            <a:off x="3443748" y="3429000"/>
+            <a:ext cx="5958436" cy="3135085"/>
+          </a:xfrm>
+          <a:prstGeom prst="rect">
+            <a:avLst/>
+          </a:prstGeom>
+        </p:spPr>
+      </p:pic>
+      <p:pic>
+        <p:nvPicPr>
+          <p:cNvPr id="15" name="Picture 14" descr="Chart, scatter chart&#10;&#10;Description automatically generated">
+            <a:extLst>
+              <a:ext uri="{FF2B5EF4-FFF2-40B4-BE49-F238E27FC236}">
+                <a16:creationId xmlns:a16="http://schemas.microsoft.com/office/drawing/2014/main" id="{3C7672C6-5DF6-A94D-9EA8-956F922A0BEB}"/>
+              </a:ext>
+            </a:extLst>
+          </p:cNvPr>
+          <p:cNvPicPr>
+            <a:picLocks noChangeAspect="1"/>
+          </p:cNvPicPr>
+          <p:nvPr/>
+        </p:nvPicPr>
+        <p:blipFill>
+          <a:blip r:embed="rId7"/>
+          <a:stretch>
+            <a:fillRect/>
+          </a:stretch>
+        </p:blipFill>
+        <p:spPr>
+          <a:xfrm>
+            <a:off x="7000468" y="3428999"/>
+            <a:ext cx="5221325" cy="3076021"/>
+          </a:xfrm>
+          <a:prstGeom prst="rect">
+            <a:avLst/>
+          </a:prstGeom>
+        </p:spPr>
+      </p:pic>
+      <p:sp>
+        <p:nvSpPr>
+          <p:cNvPr id="2" name="TextBox 1">
+            <a:extLst>
+              <a:ext uri="{FF2B5EF4-FFF2-40B4-BE49-F238E27FC236}">
+                <a16:creationId xmlns:a16="http://schemas.microsoft.com/office/drawing/2014/main" id="{6B887B62-BBB9-6C90-9BB4-18C543F99725}"/>
+              </a:ext>
+            </a:extLst>
+          </p:cNvPr>
+          <p:cNvSpPr txBox="1"/>
+          <p:nvPr/>
+        </p:nvSpPr>
+        <p:spPr>
+          <a:xfrm>
+            <a:off x="1639614" y="3005959"/>
+            <a:ext cx="767255" cy="276999"/>
+          </a:xfrm>
+          <a:prstGeom prst="rect">
+            <a:avLst/>
+          </a:prstGeom>
+          <a:solidFill>
+            <a:schemeClr val="bg1"/>
+          </a:solidFill>
+        </p:spPr>
+        <p:txBody>
+          <a:bodyPr wrap="square" rtlCol="0">
+            <a:spAutoFit/>
+          </a:bodyPr>
+          <a:lstStyle/>
+          <a:p>
+            <a:r>
+              <a:rPr lang="en-US" sz="1200" dirty="0"/>
+              <a:t>x (cm)</a:t>
+            </a:r>
+          </a:p>
+        </p:txBody>
+      </p:sp>
+      <p:sp>
+        <p:nvSpPr>
+          <p:cNvPr id="12" name="TextBox 11">
+            <a:extLst>
+              <a:ext uri="{FF2B5EF4-FFF2-40B4-BE49-F238E27FC236}">
+                <a16:creationId xmlns:a16="http://schemas.microsoft.com/office/drawing/2014/main" id="{7A378424-3BC8-EFD1-A705-4C05DA9DBAD7}"/>
+              </a:ext>
+            </a:extLst>
+          </p:cNvPr>
+          <p:cNvSpPr txBox="1"/>
+          <p:nvPr/>
+        </p:nvSpPr>
+        <p:spPr>
+          <a:xfrm>
+            <a:off x="5134318" y="3030404"/>
+            <a:ext cx="767255" cy="276999"/>
+          </a:xfrm>
+          <a:prstGeom prst="rect">
+            <a:avLst/>
+          </a:prstGeom>
+          <a:solidFill>
+            <a:schemeClr val="bg1"/>
+          </a:solidFill>
+        </p:spPr>
+        <p:txBody>
+          <a:bodyPr wrap="square" rtlCol="0">
+            <a:spAutoFit/>
+          </a:bodyPr>
+          <a:lstStyle/>
+          <a:p>
+            <a:r>
+              <a:rPr lang="en-US" sz="1200" dirty="0"/>
+              <a:t>x (cm)</a:t>
+            </a:r>
+          </a:p>
+        </p:txBody>
+      </p:sp>
+      <p:sp>
+        <p:nvSpPr>
+          <p:cNvPr id="14" name="TextBox 13">
+            <a:extLst>
+              <a:ext uri="{FF2B5EF4-FFF2-40B4-BE49-F238E27FC236}">
+                <a16:creationId xmlns:a16="http://schemas.microsoft.com/office/drawing/2014/main" id="{F59ED5C6-D11B-0246-3627-40744A03DD08}"/>
+              </a:ext>
+            </a:extLst>
+          </p:cNvPr>
+          <p:cNvSpPr txBox="1"/>
+          <p:nvPr/>
+        </p:nvSpPr>
+        <p:spPr>
+          <a:xfrm>
+            <a:off x="8404525" y="3005958"/>
+            <a:ext cx="767255" cy="276999"/>
+          </a:xfrm>
+          <a:prstGeom prst="rect">
+            <a:avLst/>
+          </a:prstGeom>
+          <a:solidFill>
+            <a:schemeClr val="bg1"/>
+          </a:solidFill>
+        </p:spPr>
+        <p:txBody>
+          <a:bodyPr wrap="square" rtlCol="0">
+            <a:spAutoFit/>
+          </a:bodyPr>
+          <a:lstStyle/>
+          <a:p>
+            <a:r>
+              <a:rPr lang="en-US" sz="1200" dirty="0"/>
+              <a:t>x (cm)</a:t>
+            </a:r>
+          </a:p>
+        </p:txBody>
+      </p:sp>
+      <p:sp>
+        <p:nvSpPr>
+          <p:cNvPr id="19" name="TextBox 18">
+            <a:extLst>
+              <a:ext uri="{FF2B5EF4-FFF2-40B4-BE49-F238E27FC236}">
+                <a16:creationId xmlns:a16="http://schemas.microsoft.com/office/drawing/2014/main" id="{24739F76-9779-DCB1-BEB2-4B238C1406F9}"/>
+              </a:ext>
+            </a:extLst>
+          </p:cNvPr>
+          <p:cNvSpPr txBox="1"/>
+          <p:nvPr/>
+        </p:nvSpPr>
+        <p:spPr>
+          <a:xfrm>
+            <a:off x="1639614" y="6287086"/>
+            <a:ext cx="767255" cy="276999"/>
+          </a:xfrm>
+          <a:prstGeom prst="rect">
+            <a:avLst/>
+          </a:prstGeom>
+          <a:solidFill>
+            <a:schemeClr val="bg1"/>
+          </a:solidFill>
+        </p:spPr>
+        <p:txBody>
+          <a:bodyPr wrap="square" rtlCol="0">
+            <a:spAutoFit/>
+          </a:bodyPr>
+          <a:lstStyle/>
+          <a:p>
+            <a:r>
+              <a:rPr lang="en-US" sz="1200" dirty="0"/>
+              <a:t>y (cm)</a:t>
+            </a:r>
+          </a:p>
+        </p:txBody>
+      </p:sp>
+      <p:sp>
+        <p:nvSpPr>
+          <p:cNvPr id="20" name="TextBox 19">
+            <a:extLst>
+              <a:ext uri="{FF2B5EF4-FFF2-40B4-BE49-F238E27FC236}">
+                <a16:creationId xmlns:a16="http://schemas.microsoft.com/office/drawing/2014/main" id="{61058AB9-098E-A1B6-5E10-389CFE7061B8}"/>
+              </a:ext>
+            </a:extLst>
+          </p:cNvPr>
+          <p:cNvSpPr txBox="1"/>
+          <p:nvPr/>
+        </p:nvSpPr>
+        <p:spPr>
+          <a:xfrm>
+            <a:off x="5047932" y="6349618"/>
+            <a:ext cx="767255" cy="276999"/>
+          </a:xfrm>
+          <a:prstGeom prst="rect">
+            <a:avLst/>
+          </a:prstGeom>
+          <a:solidFill>
+            <a:schemeClr val="bg1"/>
+          </a:solidFill>
+        </p:spPr>
+        <p:txBody>
+          <a:bodyPr wrap="square" rtlCol="0">
+            <a:spAutoFit/>
+          </a:bodyPr>
+          <a:lstStyle/>
+          <a:p>
+            <a:r>
+              <a:rPr lang="en-US" sz="1200" dirty="0"/>
+              <a:t>y (cm)</a:t>
+            </a:r>
+          </a:p>
+        </p:txBody>
+      </p:sp>
+      <p:sp>
+        <p:nvSpPr>
+          <p:cNvPr id="21" name="TextBox 20">
+            <a:extLst>
+              <a:ext uri="{FF2B5EF4-FFF2-40B4-BE49-F238E27FC236}">
+                <a16:creationId xmlns:a16="http://schemas.microsoft.com/office/drawing/2014/main" id="{F0869E87-A278-60EF-1061-EC34D65AAEA0}"/>
+              </a:ext>
+            </a:extLst>
+          </p:cNvPr>
+          <p:cNvSpPr txBox="1"/>
+          <p:nvPr/>
+        </p:nvSpPr>
+        <p:spPr>
+          <a:xfrm>
+            <a:off x="8510677" y="6243399"/>
+            <a:ext cx="767255" cy="276999"/>
+          </a:xfrm>
+          <a:prstGeom prst="rect">
+            <a:avLst/>
+          </a:prstGeom>
+          <a:solidFill>
+            <a:schemeClr val="bg1"/>
+          </a:solidFill>
+        </p:spPr>
+        <p:txBody>
+          <a:bodyPr wrap="square" rtlCol="0">
+            <a:spAutoFit/>
+          </a:bodyPr>
+          <a:lstStyle/>
+          <a:p>
+            <a:r>
+              <a:rPr lang="en-US" sz="1200" dirty="0"/>
+              <a:t>y (cm)</a:t>
+            </a:r>
+          </a:p>
+        </p:txBody>
+      </p:sp>
+      <p:sp>
+        <p:nvSpPr>
+          <p:cNvPr id="22" name="TextBox 21">
+            <a:extLst>
+              <a:ext uri="{FF2B5EF4-FFF2-40B4-BE49-F238E27FC236}">
+                <a16:creationId xmlns:a16="http://schemas.microsoft.com/office/drawing/2014/main" id="{B875A67F-3474-D65E-EB2B-DBF015767CB4}"/>
+              </a:ext>
+            </a:extLst>
+          </p:cNvPr>
+          <p:cNvSpPr txBox="1"/>
+          <p:nvPr/>
+        </p:nvSpPr>
+        <p:spPr>
+          <a:xfrm rot="16200000">
+            <a:off x="-10985" y="1426377"/>
+            <a:ext cx="767255" cy="276999"/>
+          </a:xfrm>
+          <a:prstGeom prst="rect">
+            <a:avLst/>
+          </a:prstGeom>
+          <a:solidFill>
+            <a:schemeClr val="bg1"/>
+          </a:solidFill>
+        </p:spPr>
+        <p:txBody>
+          <a:bodyPr wrap="square" rtlCol="0">
+            <a:spAutoFit/>
+          </a:bodyPr>
+          <a:lstStyle/>
+          <a:p>
+            <a:r>
+              <a:rPr lang="en-US" sz="1200" dirty="0"/>
+              <a:t>Bx (G)</a:t>
+            </a:r>
+          </a:p>
+        </p:txBody>
+      </p:sp>
+      <p:sp>
+        <p:nvSpPr>
+          <p:cNvPr id="23" name="TextBox 22">
+            <a:extLst>
+              <a:ext uri="{FF2B5EF4-FFF2-40B4-BE49-F238E27FC236}">
+                <a16:creationId xmlns:a16="http://schemas.microsoft.com/office/drawing/2014/main" id="{64B5E5A6-8AFF-5C8B-B5C8-003801EA11A9}"/>
+              </a:ext>
+            </a:extLst>
+          </p:cNvPr>
+          <p:cNvSpPr txBox="1"/>
+          <p:nvPr/>
+        </p:nvSpPr>
+        <p:spPr>
+          <a:xfrm rot="16200000">
+            <a:off x="-109191" y="4828510"/>
+            <a:ext cx="767255" cy="276999"/>
+          </a:xfrm>
+          <a:prstGeom prst="rect">
+            <a:avLst/>
+          </a:prstGeom>
+          <a:solidFill>
+            <a:schemeClr val="bg1"/>
+          </a:solidFill>
+        </p:spPr>
+        <p:txBody>
+          <a:bodyPr wrap="square" rtlCol="0">
+            <a:spAutoFit/>
+          </a:bodyPr>
+          <a:lstStyle/>
+          <a:p>
+            <a:r>
+              <a:rPr lang="en-US" sz="1200" dirty="0"/>
+              <a:t>Bx (G)</a:t>
+            </a:r>
+          </a:p>
+        </p:txBody>
+      </p:sp>
+      <p:sp>
+        <p:nvSpPr>
+          <p:cNvPr id="24" name="TextBox 23">
+            <a:extLst>
+              <a:ext uri="{FF2B5EF4-FFF2-40B4-BE49-F238E27FC236}">
+                <a16:creationId xmlns:a16="http://schemas.microsoft.com/office/drawing/2014/main" id="{F606890B-C79D-DA59-1104-5F32C0CA60A5}"/>
+              </a:ext>
+            </a:extLst>
+          </p:cNvPr>
+          <p:cNvSpPr txBox="1"/>
+          <p:nvPr/>
+        </p:nvSpPr>
+        <p:spPr>
+          <a:xfrm rot="16200000">
+            <a:off x="3219746" y="1426377"/>
+            <a:ext cx="767255" cy="276999"/>
+          </a:xfrm>
+          <a:prstGeom prst="rect">
+            <a:avLst/>
+          </a:prstGeom>
+          <a:solidFill>
+            <a:schemeClr val="bg1"/>
+          </a:solidFill>
+        </p:spPr>
+        <p:txBody>
+          <a:bodyPr wrap="square" rtlCol="0">
+            <a:spAutoFit/>
+          </a:bodyPr>
+          <a:lstStyle/>
+          <a:p>
+            <a:r>
+              <a:rPr lang="en-US" sz="1200" dirty="0"/>
+              <a:t>By (G)</a:t>
+            </a:r>
+          </a:p>
+        </p:txBody>
+      </p:sp>
+      <p:sp>
+        <p:nvSpPr>
+          <p:cNvPr id="25" name="TextBox 24">
+            <a:extLst>
+              <a:ext uri="{FF2B5EF4-FFF2-40B4-BE49-F238E27FC236}">
+                <a16:creationId xmlns:a16="http://schemas.microsoft.com/office/drawing/2014/main" id="{EC2F1C6E-066C-3584-8276-DE532AFCE857}"/>
+              </a:ext>
+            </a:extLst>
+          </p:cNvPr>
+          <p:cNvSpPr txBox="1"/>
+          <p:nvPr/>
+        </p:nvSpPr>
+        <p:spPr>
+          <a:xfrm rot="16200000">
+            <a:off x="3274424" y="4828510"/>
+            <a:ext cx="767255" cy="276999"/>
+          </a:xfrm>
+          <a:prstGeom prst="rect">
+            <a:avLst/>
+          </a:prstGeom>
+          <a:solidFill>
+            <a:schemeClr val="bg1"/>
+          </a:solidFill>
+        </p:spPr>
+        <p:txBody>
+          <a:bodyPr wrap="square" rtlCol="0">
+            <a:spAutoFit/>
+          </a:bodyPr>
+          <a:lstStyle/>
+          <a:p>
+            <a:r>
+              <a:rPr lang="en-US" sz="1200" dirty="0"/>
+              <a:t>By (G)</a:t>
+            </a:r>
+          </a:p>
+        </p:txBody>
+      </p:sp>
+      <p:sp>
+        <p:nvSpPr>
+          <p:cNvPr id="26" name="TextBox 25">
+            <a:extLst>
+              <a:ext uri="{FF2B5EF4-FFF2-40B4-BE49-F238E27FC236}">
+                <a16:creationId xmlns:a16="http://schemas.microsoft.com/office/drawing/2014/main" id="{61D85233-C77D-03F6-C1A4-AD996D95DC96}"/>
+              </a:ext>
+            </a:extLst>
+          </p:cNvPr>
+          <p:cNvSpPr txBox="1"/>
+          <p:nvPr/>
+        </p:nvSpPr>
+        <p:spPr>
+          <a:xfrm rot="16200000">
+            <a:off x="6875703" y="1426377"/>
+            <a:ext cx="767255" cy="276999"/>
+          </a:xfrm>
+          <a:prstGeom prst="rect">
+            <a:avLst/>
+          </a:prstGeom>
+          <a:solidFill>
+            <a:schemeClr val="bg1"/>
+          </a:solidFill>
+        </p:spPr>
+        <p:txBody>
+          <a:bodyPr wrap="square" rtlCol="0">
+            <a:spAutoFit/>
+          </a:bodyPr>
+          <a:lstStyle/>
+          <a:p>
+            <a:r>
+              <a:rPr lang="en-US" sz="1200" dirty="0"/>
+              <a:t>Bz (G)</a:t>
+            </a:r>
+          </a:p>
+        </p:txBody>
+      </p:sp>
+      <p:sp>
+        <p:nvSpPr>
+          <p:cNvPr id="27" name="TextBox 26">
+            <a:extLst>
+              <a:ext uri="{FF2B5EF4-FFF2-40B4-BE49-F238E27FC236}">
+                <a16:creationId xmlns:a16="http://schemas.microsoft.com/office/drawing/2014/main" id="{7CD5D71F-C3F9-D7A3-2E11-A94BE2A40627}"/>
+              </a:ext>
+            </a:extLst>
+          </p:cNvPr>
+          <p:cNvSpPr txBox="1"/>
+          <p:nvPr/>
+        </p:nvSpPr>
+        <p:spPr>
+          <a:xfrm rot="16200000">
+            <a:off x="6856671" y="4828509"/>
+            <a:ext cx="767255" cy="276999"/>
+          </a:xfrm>
+          <a:prstGeom prst="rect">
+            <a:avLst/>
+          </a:prstGeom>
+          <a:solidFill>
+            <a:schemeClr val="bg1"/>
+          </a:solidFill>
+        </p:spPr>
+        <p:txBody>
+          <a:bodyPr wrap="square" rtlCol="0">
+            <a:spAutoFit/>
+          </a:bodyPr>
+          <a:lstStyle/>
+          <a:p>
+            <a:r>
+              <a:rPr lang="en-US" sz="1200" dirty="0"/>
+              <a:t>Bz (G)</a:t>
+            </a:r>
+          </a:p>
+        </p:txBody>
+      </p:sp>
+      <p:pic>
+        <p:nvPicPr>
+          <p:cNvPr id="6" name="Picture 5" descr="Text&#10;&#10;Description automatically generated with medium confidence">
+            <a:extLst>
+              <a:ext uri="{FF2B5EF4-FFF2-40B4-BE49-F238E27FC236}">
+                <a16:creationId xmlns:a16="http://schemas.microsoft.com/office/drawing/2014/main" id="{1421F2DE-3C88-A308-CC0D-9AC1A9742F32}"/>
+              </a:ext>
+            </a:extLst>
+          </p:cNvPr>
+          <p:cNvPicPr>
+            <a:picLocks noChangeAspect="1"/>
+          </p:cNvPicPr>
+          <p:nvPr/>
+        </p:nvPicPr>
+        <p:blipFill>
+          <a:blip r:embed="rId8"/>
+          <a:stretch>
+            <a:fillRect/>
+          </a:stretch>
+        </p:blipFill>
+        <p:spPr>
+          <a:xfrm>
+            <a:off x="9922646" y="310941"/>
+            <a:ext cx="2297135" cy="1740613"/>
+          </a:xfrm>
+          <a:prstGeom prst="rect">
+            <a:avLst/>
+          </a:prstGeom>
+        </p:spPr>
+      </p:pic>
+      <p:sp>
+        <p:nvSpPr>
+          <p:cNvPr id="8" name="TextBox 7">
+            <a:extLst>
+              <a:ext uri="{FF2B5EF4-FFF2-40B4-BE49-F238E27FC236}">
+                <a16:creationId xmlns:a16="http://schemas.microsoft.com/office/drawing/2014/main" id="{D8824135-AC2F-148A-B5E6-FA0BE5681A22}"/>
+              </a:ext>
+            </a:extLst>
+          </p:cNvPr>
+          <p:cNvSpPr txBox="1"/>
+          <p:nvPr/>
+        </p:nvSpPr>
+        <p:spPr>
+          <a:xfrm>
+            <a:off x="10134600" y="3526971"/>
+            <a:ext cx="1306286" cy="1440037"/>
+          </a:xfrm>
+          <a:prstGeom prst="rect">
+            <a:avLst/>
+          </a:prstGeom>
+          <a:solidFill>
+            <a:schemeClr val="bg1"/>
+          </a:solidFill>
+        </p:spPr>
+        <p:txBody>
+          <a:bodyPr wrap="square" rtlCol="0">
+            <a:spAutoFit/>
+          </a:bodyPr>
+          <a:lstStyle/>
+          <a:p>
+            <a:endParaRPr lang="en-US" dirty="0"/>
+          </a:p>
+        </p:txBody>
+      </p:sp>
+    </p:spTree>
+    <p:extLst>
+      <p:ext uri="{BB962C8B-B14F-4D97-AF65-F5344CB8AC3E}">
+        <p14:creationId xmlns:p14="http://schemas.microsoft.com/office/powerpoint/2010/main" val="2330940232"/>
+      </p:ext>
+    </p:extLst>
+  </p:cSld>
+  <p:clrMapOvr>
+    <a:masterClrMapping/>
+  </p:clrMapOvr>
+</p:sld>
+</file>
+
+<file path=ppt/slides/slide3.xml><?xml version="1.0" encoding="utf-8"?>
+<p:sld xmlns:a="http://schemas.openxmlformats.org/drawingml/2006/main" xmlns:r="http://schemas.openxmlformats.org/officeDocument/2006/relationships" xmlns:p="http://schemas.openxmlformats.org/presentationml/2006/main">
+  <p:cSld>
+    <p:spTree>
+      <p:nvGrpSpPr>
+        <p:cNvPr id="1" name=""/>
+        <p:cNvGrpSpPr/>
+        <p:nvPr/>
+      </p:nvGrpSpPr>
+      <p:grpSpPr>
+        <a:xfrm>
+          <a:off x="0" y="0"/>
+          <a:ext cx="0" cy="0"/>
+          <a:chOff x="0" y="0"/>
+          <a:chExt cx="0" cy="0"/>
+        </a:xfrm>
+      </p:grpSpPr>
+      <p:pic>
+        <p:nvPicPr>
+          <p:cNvPr id="7" name="Picture 6" descr="Chart, scatter chart&#10;&#10;Description automatically generated">
+            <a:extLst>
+              <a:ext uri="{FF2B5EF4-FFF2-40B4-BE49-F238E27FC236}">
+                <a16:creationId xmlns:a16="http://schemas.microsoft.com/office/drawing/2014/main" id="{67E39C00-F53F-B54D-B1A7-7BC2678B21E1}"/>
+              </a:ext>
+            </a:extLst>
+          </p:cNvPr>
+          <p:cNvPicPr>
+            <a:picLocks noChangeAspect="1"/>
+          </p:cNvPicPr>
+          <p:nvPr/>
+        </p:nvPicPr>
+        <p:blipFill>
+          <a:blip r:embed="rId2"/>
+          <a:stretch>
+            <a:fillRect/>
+          </a:stretch>
+        </p:blipFill>
+        <p:spPr>
+          <a:xfrm>
+            <a:off x="0" y="1065875"/>
+            <a:ext cx="8164443" cy="4283412"/>
+          </a:xfrm>
+          <a:prstGeom prst="rect">
+            <a:avLst/>
+          </a:prstGeom>
+        </p:spPr>
+      </p:pic>
+      <p:pic>
+        <p:nvPicPr>
+          <p:cNvPr id="9" name="Picture 8" descr="Chart, scatter chart&#10;&#10;Description automatically generated">
+            <a:extLst>
+              <a:ext uri="{FF2B5EF4-FFF2-40B4-BE49-F238E27FC236}">
+                <a16:creationId xmlns:a16="http://schemas.microsoft.com/office/drawing/2014/main" id="{611074B3-8E86-7F49-B8DB-34F85BAB3C33}"/>
+              </a:ext>
+            </a:extLst>
+          </p:cNvPr>
+          <p:cNvPicPr>
+            <a:picLocks noChangeAspect="1"/>
+          </p:cNvPicPr>
+          <p:nvPr/>
+        </p:nvPicPr>
+        <p:blipFill>
+          <a:blip r:embed="rId3"/>
+          <a:stretch>
+            <a:fillRect/>
+          </a:stretch>
+        </p:blipFill>
+        <p:spPr>
+          <a:xfrm>
             <a:off x="4929351" y="1065875"/>
             <a:ext cx="6837727" cy="4285309"/>
           </a:xfrm>
@@ -3787,6 +4496,276 @@
     <p:extLst>
       <p:ext uri="{BB962C8B-B14F-4D97-AF65-F5344CB8AC3E}">
         <p14:creationId xmlns:p14="http://schemas.microsoft.com/office/powerpoint/2010/main" val="527226861"/>
+      </p:ext>
+    </p:extLst>
+  </p:cSld>
+  <p:clrMapOvr>
+    <a:masterClrMapping/>
+  </p:clrMapOvr>
+</p:sld>
+</file>
+
+<file path=ppt/slides/slide4.xml><?xml version="1.0" encoding="utf-8"?>
+<p:sld xmlns:a="http://schemas.openxmlformats.org/drawingml/2006/main" xmlns:r="http://schemas.openxmlformats.org/officeDocument/2006/relationships" xmlns:p="http://schemas.openxmlformats.org/presentationml/2006/main">
+  <p:cSld>
+    <p:spTree>
+      <p:nvGrpSpPr>
+        <p:cNvPr id="1" name=""/>
+        <p:cNvGrpSpPr/>
+        <p:nvPr/>
+      </p:nvGrpSpPr>
+      <p:grpSpPr>
+        <a:xfrm>
+          <a:off x="0" y="0"/>
+          <a:ext cx="0" cy="0"/>
+          <a:chOff x="0" y="0"/>
+          <a:chExt cx="0" cy="0"/>
+        </a:xfrm>
+      </p:grpSpPr>
+      <p:pic>
+        <p:nvPicPr>
+          <p:cNvPr id="7" name="Picture 6" descr="Chart, scatter chart&#10;&#10;Description automatically generated">
+            <a:extLst>
+              <a:ext uri="{FF2B5EF4-FFF2-40B4-BE49-F238E27FC236}">
+                <a16:creationId xmlns:a16="http://schemas.microsoft.com/office/drawing/2014/main" id="{67E39C00-F53F-B54D-B1A7-7BC2678B21E1}"/>
+              </a:ext>
+            </a:extLst>
+          </p:cNvPr>
+          <p:cNvPicPr>
+            <a:picLocks noChangeAspect="1"/>
+          </p:cNvPicPr>
+          <p:nvPr/>
+        </p:nvPicPr>
+        <p:blipFill>
+          <a:blip r:embed="rId2"/>
+          <a:stretch>
+            <a:fillRect/>
+          </a:stretch>
+        </p:blipFill>
+        <p:spPr>
+          <a:xfrm>
+            <a:off x="0" y="1065875"/>
+            <a:ext cx="8164443" cy="4283412"/>
+          </a:xfrm>
+          <a:prstGeom prst="rect">
+            <a:avLst/>
+          </a:prstGeom>
+        </p:spPr>
+      </p:pic>
+      <p:pic>
+        <p:nvPicPr>
+          <p:cNvPr id="9" name="Picture 8" descr="Chart, scatter chart&#10;&#10;Description automatically generated">
+            <a:extLst>
+              <a:ext uri="{FF2B5EF4-FFF2-40B4-BE49-F238E27FC236}">
+                <a16:creationId xmlns:a16="http://schemas.microsoft.com/office/drawing/2014/main" id="{611074B3-8E86-7F49-B8DB-34F85BAB3C33}"/>
+              </a:ext>
+            </a:extLst>
+          </p:cNvPr>
+          <p:cNvPicPr>
+            <a:picLocks noChangeAspect="1"/>
+          </p:cNvPicPr>
+          <p:nvPr/>
+        </p:nvPicPr>
+        <p:blipFill>
+          <a:blip r:embed="rId3"/>
+          <a:stretch>
+            <a:fillRect/>
+          </a:stretch>
+        </p:blipFill>
+        <p:spPr>
+          <a:xfrm>
+            <a:off x="4929351" y="1065875"/>
+            <a:ext cx="7262649" cy="4285309"/>
+          </a:xfrm>
+          <a:prstGeom prst="rect">
+            <a:avLst/>
+          </a:prstGeom>
+        </p:spPr>
+      </p:pic>
+      <p:sp>
+        <p:nvSpPr>
+          <p:cNvPr id="6" name="TextBox 5">
+            <a:extLst>
+              <a:ext uri="{FF2B5EF4-FFF2-40B4-BE49-F238E27FC236}">
+                <a16:creationId xmlns:a16="http://schemas.microsoft.com/office/drawing/2014/main" id="{39444E69-F869-7540-B713-F27772761FA9}"/>
+              </a:ext>
+            </a:extLst>
+          </p:cNvPr>
+          <p:cNvSpPr txBox="1"/>
+          <p:nvPr/>
+        </p:nvSpPr>
+        <p:spPr>
+          <a:xfrm>
+            <a:off x="2345008" y="5000222"/>
+            <a:ext cx="767255" cy="276999"/>
+          </a:xfrm>
+          <a:prstGeom prst="rect">
+            <a:avLst/>
+          </a:prstGeom>
+          <a:solidFill>
+            <a:schemeClr val="bg1"/>
+          </a:solidFill>
+        </p:spPr>
+        <p:txBody>
+          <a:bodyPr wrap="square" rtlCol="0">
+            <a:spAutoFit/>
+          </a:bodyPr>
+          <a:lstStyle/>
+          <a:p>
+            <a:pPr algn="ctr"/>
+            <a:r>
+              <a:rPr lang="en-US" sz="1200" dirty="0"/>
+              <a:t>x (cm)</a:t>
+            </a:r>
+          </a:p>
+        </p:txBody>
+      </p:sp>
+      <p:sp>
+        <p:nvSpPr>
+          <p:cNvPr id="8" name="TextBox 7">
+            <a:extLst>
+              <a:ext uri="{FF2B5EF4-FFF2-40B4-BE49-F238E27FC236}">
+                <a16:creationId xmlns:a16="http://schemas.microsoft.com/office/drawing/2014/main" id="{6230B68B-CA6F-F321-916D-04CE3DBBECA6}"/>
+              </a:ext>
+            </a:extLst>
+          </p:cNvPr>
+          <p:cNvSpPr txBox="1"/>
+          <p:nvPr/>
+        </p:nvSpPr>
+        <p:spPr>
+          <a:xfrm>
+            <a:off x="6977968" y="5000221"/>
+            <a:ext cx="767255" cy="276999"/>
+          </a:xfrm>
+          <a:prstGeom prst="rect">
+            <a:avLst/>
+          </a:prstGeom>
+          <a:solidFill>
+            <a:schemeClr val="bg1"/>
+          </a:solidFill>
+        </p:spPr>
+        <p:txBody>
+          <a:bodyPr wrap="square" rtlCol="0">
+            <a:spAutoFit/>
+          </a:bodyPr>
+          <a:lstStyle/>
+          <a:p>
+            <a:pPr algn="ctr"/>
+            <a:r>
+              <a:rPr lang="en-US" sz="1200" dirty="0"/>
+              <a:t>y (cm)</a:t>
+            </a:r>
+          </a:p>
+        </p:txBody>
+      </p:sp>
+      <p:sp>
+        <p:nvSpPr>
+          <p:cNvPr id="12" name="TextBox 11">
+            <a:extLst>
+              <a:ext uri="{FF2B5EF4-FFF2-40B4-BE49-F238E27FC236}">
+                <a16:creationId xmlns:a16="http://schemas.microsoft.com/office/drawing/2014/main" id="{36F2AAF4-28F0-2334-0B8D-0C374BFB138A}"/>
+              </a:ext>
+            </a:extLst>
+          </p:cNvPr>
+          <p:cNvSpPr txBox="1"/>
+          <p:nvPr/>
+        </p:nvSpPr>
+        <p:spPr>
+          <a:xfrm rot="16200000">
+            <a:off x="11111" y="2906873"/>
+            <a:ext cx="767255" cy="276999"/>
+          </a:xfrm>
+          <a:prstGeom prst="rect">
+            <a:avLst/>
+          </a:prstGeom>
+          <a:solidFill>
+            <a:schemeClr val="bg1"/>
+          </a:solidFill>
+        </p:spPr>
+        <p:txBody>
+          <a:bodyPr wrap="square" rtlCol="0">
+            <a:spAutoFit/>
+          </a:bodyPr>
+          <a:lstStyle/>
+          <a:p>
+            <a:r>
+              <a:rPr lang="en-US" sz="1200" dirty="0"/>
+              <a:t>|B| (G)</a:t>
+            </a:r>
+          </a:p>
+        </p:txBody>
+      </p:sp>
+      <p:sp>
+        <p:nvSpPr>
+          <p:cNvPr id="13" name="TextBox 12">
+            <a:extLst>
+              <a:ext uri="{FF2B5EF4-FFF2-40B4-BE49-F238E27FC236}">
+                <a16:creationId xmlns:a16="http://schemas.microsoft.com/office/drawing/2014/main" id="{85A3A858-4B99-698E-D72F-7A70D087D150}"/>
+              </a:ext>
+            </a:extLst>
+          </p:cNvPr>
+          <p:cNvSpPr txBox="1"/>
+          <p:nvPr/>
+        </p:nvSpPr>
+        <p:spPr>
+          <a:xfrm rot="16200000">
+            <a:off x="4866140" y="2906873"/>
+            <a:ext cx="767255" cy="276999"/>
+          </a:xfrm>
+          <a:prstGeom prst="rect">
+            <a:avLst/>
+          </a:prstGeom>
+          <a:solidFill>
+            <a:schemeClr val="bg1"/>
+          </a:solidFill>
+        </p:spPr>
+        <p:txBody>
+          <a:bodyPr wrap="square" rtlCol="0">
+            <a:spAutoFit/>
+          </a:bodyPr>
+          <a:lstStyle/>
+          <a:p>
+            <a:r>
+              <a:rPr lang="en-US" sz="1200" dirty="0"/>
+              <a:t>|B| (G)</a:t>
+            </a:r>
+          </a:p>
+        </p:txBody>
+      </p:sp>
+      <p:pic>
+        <p:nvPicPr>
+          <p:cNvPr id="3" name="Picture 2" descr="Text&#10;&#10;Description automatically generated with medium confidence">
+            <a:extLst>
+              <a:ext uri="{FF2B5EF4-FFF2-40B4-BE49-F238E27FC236}">
+                <a16:creationId xmlns:a16="http://schemas.microsoft.com/office/drawing/2014/main" id="{D1303F31-E786-7691-A37E-08DC8AF6F695}"/>
+              </a:ext>
+            </a:extLst>
+          </p:cNvPr>
+          <p:cNvPicPr>
+            <a:picLocks noChangeAspect="1"/>
+          </p:cNvPicPr>
+          <p:nvPr/>
+        </p:nvPicPr>
+        <p:blipFill>
+          <a:blip r:embed="rId4"/>
+          <a:stretch>
+            <a:fillRect/>
+          </a:stretch>
+        </p:blipFill>
+        <p:spPr>
+          <a:xfrm>
+            <a:off x="9232388" y="1317171"/>
+            <a:ext cx="3041179" cy="2304398"/>
+          </a:xfrm>
+          <a:prstGeom prst="rect">
+            <a:avLst/>
+          </a:prstGeom>
+        </p:spPr>
+      </p:pic>
+    </p:spTree>
+    <p:extLst>
+      <p:ext uri="{BB962C8B-B14F-4D97-AF65-F5344CB8AC3E}">
+        <p14:creationId xmlns:p14="http://schemas.microsoft.com/office/powerpoint/2010/main" val="1665137931"/>
       </p:ext>
     </p:extLst>
   </p:cSld>

</xml_diff>